<commit_message>
To use powerpoint on Windows
</commit_message>
<xml_diff>
--- a/relaxed_data analysis.pptx
+++ b/relaxed_data analysis.pptx
@@ -20,6 +20,10 @@
     <p:sldId id="268" r:id="rId15"/>
     <p:sldId id="269" r:id="rId16"/>
     <p:sldId id="270" r:id="rId17"/>
+    <p:sldId id="271" r:id="rId18"/>
+    <p:sldId id="272" r:id="rId19"/>
+    <p:sldId id="273" r:id="rId20"/>
+    <p:sldId id="274" r:id="rId21"/>
   </p:sldIdLst>
   <p:sldSz cx="10080625" cy="5670550"/>
   <p:notesSz cx="7772400" cy="10058400"/>
@@ -1681,7 +1685,7 @@
           <a:bodyPr lIns="0" rIns="0" tIns="0" bIns="0"/>
           <a:p>
             <a:pPr algn="r"/>
-            <a:fld id="{DABA9505-58AC-482A-BDF1-CB8A34F9012B}" type="slidenum">
+            <a:fld id="{55C9ED05-0B18-4340-8A76-B1817EA96C33}" type="slidenum">
               <a:rPr b="0" lang="en-US" sz="1400" spc="-1" strike="noStrike">
                 <a:latin typeface="Times New Roman"/>
               </a:rPr>
@@ -1857,7 +1861,7 @@
       </p:grpSpPr>
       <p:sp>
         <p:nvSpPr>
-          <p:cNvPr id="82" name="TextShape 1"/>
+          <p:cNvPr id="76" name="TextShape 1"/>
           <p:cNvSpPr txBox="1"/>
           <p:nvPr/>
         </p:nvSpPr>
@@ -1878,12 +1882,6 @@
           <a:bodyPr lIns="0" rIns="0" tIns="0" bIns="0" anchor="ctr"/>
           <a:p>
             <a:pPr algn="ctr"/>
-            <a:r>
-              <a:rPr b="0" lang="en-US" sz="4400" spc="-1" strike="noStrike">
-                <a:latin typeface="Arial"/>
-              </a:rPr>
-              <a:t>Chip 3 – 20k rad</a:t>
-            </a:r>
             <a:endParaRPr b="0" lang="en-US" sz="4400" spc="-1" strike="noStrike">
               <a:latin typeface="Arial"/>
             </a:endParaRPr>
@@ -1892,14 +1890,14 @@
       </p:sp>
       <p:sp>
         <p:nvSpPr>
-          <p:cNvPr id="83" name="TextShape 2"/>
+          <p:cNvPr id="77" name="TextShape 2"/>
           <p:cNvSpPr txBox="1"/>
           <p:nvPr/>
         </p:nvSpPr>
         <p:spPr>
           <a:xfrm>
-            <a:off x="6356160" y="3749040"/>
-            <a:ext cx="3245040" cy="1508040"/>
+            <a:off x="504000" y="1326600"/>
+            <a:ext cx="9071640" cy="3288240"/>
           </a:xfrm>
           <a:prstGeom prst="rect">
             <a:avLst/>
@@ -1914,67 +1912,6 @@
             <a:normAutofit/>
           </a:bodyPr>
           <a:p>
-            <a:pPr marL="432000" indent="-324000">
-              <a:spcBef>
-                <a:spcPts val="1417"/>
-              </a:spcBef>
-              <a:buClr>
-                <a:srgbClr val="000000"/>
-              </a:buClr>
-              <a:buSzPct val="45000"/>
-              <a:buFont typeface="Wingdings" charset="2"/>
-              <a:buChar char=""/>
-            </a:pPr>
-            <a:r>
-              <a:rPr b="0" lang="en-US" sz="3200" spc="-1" strike="noStrike">
-                <a:latin typeface="Arial"/>
-              </a:rPr>
-              <a:t>Corruption rate of  2.4 %</a:t>
-            </a:r>
-            <a:endParaRPr b="0" lang="en-US" sz="3200" spc="-1" strike="noStrike">
-              <a:latin typeface="Arial"/>
-            </a:endParaRPr>
-          </a:p>
-          <a:p>
-            <a:pPr marL="432000" indent="-324000">
-              <a:spcBef>
-                <a:spcPts val="1417"/>
-              </a:spcBef>
-              <a:buClr>
-                <a:srgbClr val="000000"/>
-              </a:buClr>
-              <a:buSzPct val="45000"/>
-              <a:buFont typeface="Wingdings" charset="2"/>
-              <a:buChar char=""/>
-            </a:pPr>
-            <a:r>
-              <a:rPr b="0" lang="en-US" sz="3200" spc="-1" strike="noStrike">
-                <a:latin typeface="Arial"/>
-              </a:rPr>
-              <a:t>Corruption rate of  2.0 %</a:t>
-            </a:r>
-            <a:endParaRPr b="0" lang="en-US" sz="3200" spc="-1" strike="noStrike">
-              <a:latin typeface="Arial"/>
-            </a:endParaRPr>
-          </a:p>
-          <a:p>
-            <a:pPr marL="432000" indent="-324000">
-              <a:spcBef>
-                <a:spcPts val="1417"/>
-              </a:spcBef>
-              <a:buClr>
-                <a:srgbClr val="000000"/>
-              </a:buClr>
-              <a:buSzPct val="45000"/>
-              <a:buFont typeface="Wingdings" charset="2"/>
-              <a:buChar char=""/>
-            </a:pPr>
-            <a:r>
-              <a:rPr b="0" lang="en-US" sz="3200" spc="-1" strike="noStrike">
-                <a:latin typeface="Arial"/>
-              </a:rPr>
-              <a:t>Corruption rate of  2.57 %</a:t>
-            </a:r>
             <a:endParaRPr b="0" lang="en-US" sz="3200" spc="-1" strike="noStrike">
               <a:latin typeface="Arial"/>
             </a:endParaRPr>
@@ -1983,7 +1920,7 @@
       </p:sp>
       <p:pic>
         <p:nvPicPr>
-          <p:cNvPr id="84" name="" descr=""/>
+          <p:cNvPr id="78" name="" descr=""/>
           <p:cNvPicPr/>
           <p:nvPr/>
         </p:nvPicPr>
@@ -1993,8 +1930,8 @@
         </p:blipFill>
         <p:spPr>
           <a:xfrm>
-            <a:off x="182880" y="1013760"/>
-            <a:ext cx="3383280" cy="2407680"/>
+            <a:off x="731520" y="1575720"/>
+            <a:ext cx="4190760" cy="2904840"/>
           </a:xfrm>
           <a:prstGeom prst="rect">
             <a:avLst/>
@@ -2006,7 +1943,7 @@
       </p:pic>
       <p:pic>
         <p:nvPicPr>
-          <p:cNvPr id="85" name="" descr=""/>
+          <p:cNvPr id="79" name="" descr=""/>
           <p:cNvPicPr/>
           <p:nvPr/>
         </p:nvPicPr>
@@ -2016,31 +1953,8 @@
         </p:blipFill>
         <p:spPr>
           <a:xfrm>
-            <a:off x="5577840" y="1005840"/>
-            <a:ext cx="3410280" cy="2468880"/>
-          </a:xfrm>
-          <a:prstGeom prst="rect">
-            <a:avLst/>
-          </a:prstGeom>
-          <a:ln>
-            <a:noFill/>
-          </a:ln>
-        </p:spPr>
-      </p:pic>
-      <p:pic>
-        <p:nvPicPr>
-          <p:cNvPr id="86" name="" descr=""/>
-          <p:cNvPicPr/>
-          <p:nvPr/>
-        </p:nvPicPr>
-        <p:blipFill>
-          <a:blip r:embed="rId3"/>
-          <a:stretch/>
-        </p:blipFill>
-        <p:spPr>
-          <a:xfrm>
-            <a:off x="2943360" y="3383280"/>
-            <a:ext cx="3366000" cy="2258280"/>
+            <a:off x="5212080" y="1554480"/>
+            <a:ext cx="4171680" cy="2923920"/>
           </a:xfrm>
           <a:prstGeom prst="rect">
             <a:avLst/>
@@ -2101,7 +2015,7 @@
       </p:grpSpPr>
       <p:sp>
         <p:nvSpPr>
-          <p:cNvPr id="87" name="TextShape 1"/>
+          <p:cNvPr id="80" name="TextShape 1"/>
           <p:cNvSpPr txBox="1"/>
           <p:nvPr/>
         </p:nvSpPr>
@@ -2130,7 +2044,7 @@
       </p:sp>
       <p:sp>
         <p:nvSpPr>
-          <p:cNvPr id="88" name="TextShape 2"/>
+          <p:cNvPr id="81" name="TextShape 2"/>
           <p:cNvSpPr txBox="1"/>
           <p:nvPr/>
         </p:nvSpPr>
@@ -2160,7 +2074,7 @@
       </p:sp>
       <p:pic>
         <p:nvPicPr>
-          <p:cNvPr id="89" name="" descr=""/>
+          <p:cNvPr id="82" name="" descr=""/>
           <p:cNvPicPr/>
           <p:nvPr/>
         </p:nvPicPr>
@@ -2170,8 +2084,8 @@
         </p:blipFill>
         <p:spPr>
           <a:xfrm>
-            <a:off x="274320" y="1463040"/>
-            <a:ext cx="4352400" cy="2962080"/>
+            <a:off x="217440" y="182880"/>
+            <a:ext cx="3623040" cy="2572560"/>
           </a:xfrm>
           <a:prstGeom prst="rect">
             <a:avLst/>
@@ -2183,7 +2097,7 @@
       </p:pic>
       <p:pic>
         <p:nvPicPr>
-          <p:cNvPr id="90" name="" descr=""/>
+          <p:cNvPr id="83" name="" descr=""/>
           <p:cNvPicPr/>
           <p:nvPr/>
         </p:nvPicPr>
@@ -2193,8 +2107,31 @@
         </p:blipFill>
         <p:spPr>
           <a:xfrm>
-            <a:off x="5050440" y="1345320"/>
-            <a:ext cx="4276440" cy="2952360"/>
+            <a:off x="6297120" y="91440"/>
+            <a:ext cx="3688560" cy="2651760"/>
+          </a:xfrm>
+          <a:prstGeom prst="rect">
+            <a:avLst/>
+          </a:prstGeom>
+          <a:ln>
+            <a:noFill/>
+          </a:ln>
+        </p:spPr>
+      </p:pic>
+      <p:pic>
+        <p:nvPicPr>
+          <p:cNvPr id="84" name="" descr=""/>
+          <p:cNvPicPr/>
+          <p:nvPr/>
+        </p:nvPicPr>
+        <p:blipFill>
+          <a:blip r:embed="rId3"/>
+          <a:stretch/>
+        </p:blipFill>
+        <p:spPr>
+          <a:xfrm>
+            <a:off x="3347280" y="2805840"/>
+            <a:ext cx="3740760" cy="2680560"/>
           </a:xfrm>
           <a:prstGeom prst="rect">
             <a:avLst/>
@@ -2255,13 +2192,13 @@
       </p:grpSpPr>
       <p:sp>
         <p:nvSpPr>
-          <p:cNvPr id="91" name="TextShape 1"/>
+          <p:cNvPr id="85" name="TextShape 1"/>
           <p:cNvSpPr txBox="1"/>
           <p:nvPr/>
         </p:nvSpPr>
         <p:spPr>
           <a:xfrm>
-            <a:off x="504000" y="74160"/>
+            <a:off x="504000" y="212760"/>
             <a:ext cx="9071640" cy="1250280"/>
           </a:xfrm>
           <a:prstGeom prst="rect">
@@ -2280,7 +2217,7 @@
               <a:rPr b="0" lang="en-US" sz="4400" spc="-1" strike="noStrike">
                 <a:latin typeface="Arial"/>
               </a:rPr>
-              <a:t>Fixed Failed Bytes 1 Month vs 3 Months</a:t>
+              <a:t>Bytes that got fixed after 1 month and later corrupted after 3 months</a:t>
             </a:r>
             <a:endParaRPr b="0" lang="en-US" sz="4400" spc="-1" strike="noStrike">
               <a:latin typeface="Arial"/>
@@ -2290,7 +2227,7 @@
       </p:sp>
       <p:sp>
         <p:nvSpPr>
-          <p:cNvPr id="92" name="TextShape 2"/>
+          <p:cNvPr id="86" name="TextShape 2"/>
           <p:cNvSpPr txBox="1"/>
           <p:nvPr/>
         </p:nvSpPr>
@@ -2320,7 +2257,7 @@
       </p:sp>
       <p:pic>
         <p:nvPicPr>
-          <p:cNvPr id="93" name="" descr=""/>
+          <p:cNvPr id="87" name="" descr=""/>
           <p:cNvPicPr/>
           <p:nvPr/>
         </p:nvPicPr>
@@ -2330,31 +2267,8 @@
         </p:blipFill>
         <p:spPr>
           <a:xfrm>
-            <a:off x="504000" y="1522440"/>
-            <a:ext cx="4314600" cy="3323880"/>
-          </a:xfrm>
-          <a:prstGeom prst="rect">
-            <a:avLst/>
-          </a:prstGeom>
-          <a:ln>
-            <a:noFill/>
-          </a:ln>
-        </p:spPr>
-      </p:pic>
-      <p:pic>
-        <p:nvPicPr>
-          <p:cNvPr id="94" name="" descr=""/>
-          <p:cNvPicPr/>
-          <p:nvPr/>
-        </p:nvPicPr>
-        <p:blipFill>
-          <a:blip r:embed="rId2"/>
-          <a:stretch/>
-        </p:blipFill>
-        <p:spPr>
-          <a:xfrm>
-            <a:off x="5239080" y="1488240"/>
-            <a:ext cx="4362120" cy="3266640"/>
+            <a:off x="2878920" y="1903320"/>
+            <a:ext cx="4161960" cy="2943000"/>
           </a:xfrm>
           <a:prstGeom prst="rect">
             <a:avLst/>
@@ -2415,14 +2329,14 @@
       </p:grpSpPr>
       <p:sp>
         <p:nvSpPr>
-          <p:cNvPr id="95" name="TextShape 1"/>
+          <p:cNvPr id="88" name="TextShape 1"/>
           <p:cNvSpPr txBox="1"/>
           <p:nvPr/>
         </p:nvSpPr>
         <p:spPr>
           <a:xfrm>
-            <a:off x="504000" y="74160"/>
-            <a:ext cx="9071640" cy="1250280"/>
+            <a:off x="504000" y="226080"/>
+            <a:ext cx="9071640" cy="946440"/>
           </a:xfrm>
           <a:prstGeom prst="rect">
             <a:avLst/>
@@ -2440,7 +2354,7 @@
               <a:rPr b="0" lang="en-US" sz="4400" spc="-1" strike="noStrike">
                 <a:latin typeface="Arial"/>
               </a:rPr>
-              <a:t>New Failed Bytes 1 Month vs 3 Months</a:t>
+              <a:t>Chip 3 – 20k rad</a:t>
             </a:r>
             <a:endParaRPr b="0" lang="en-US" sz="4400" spc="-1" strike="noStrike">
               <a:latin typeface="Arial"/>
@@ -2450,14 +2364,14 @@
       </p:sp>
       <p:sp>
         <p:nvSpPr>
-          <p:cNvPr id="96" name="TextShape 2"/>
+          <p:cNvPr id="89" name="TextShape 2"/>
           <p:cNvSpPr txBox="1"/>
           <p:nvPr/>
         </p:nvSpPr>
         <p:spPr>
           <a:xfrm>
-            <a:off x="504000" y="1326600"/>
-            <a:ext cx="9071640" cy="3288240"/>
+            <a:off x="6356160" y="3749040"/>
+            <a:ext cx="3245040" cy="1508040"/>
           </a:xfrm>
           <a:prstGeom prst="rect">
             <a:avLst/>
@@ -2472,6 +2386,67 @@
             <a:normAutofit/>
           </a:bodyPr>
           <a:p>
+            <a:pPr marL="432000" indent="-324000">
+              <a:spcBef>
+                <a:spcPts val="1417"/>
+              </a:spcBef>
+              <a:buClr>
+                <a:srgbClr val="000000"/>
+              </a:buClr>
+              <a:buSzPct val="45000"/>
+              <a:buFont typeface="Wingdings" charset="2"/>
+              <a:buChar char=""/>
+            </a:pPr>
+            <a:r>
+              <a:rPr b="0" lang="en-US" sz="3200" spc="-1" strike="noStrike">
+                <a:latin typeface="Arial"/>
+              </a:rPr>
+              <a:t>Corruption rate of  2.4 %</a:t>
+            </a:r>
+            <a:endParaRPr b="0" lang="en-US" sz="3200" spc="-1" strike="noStrike">
+              <a:latin typeface="Arial"/>
+            </a:endParaRPr>
+          </a:p>
+          <a:p>
+            <a:pPr marL="432000" indent="-324000">
+              <a:spcBef>
+                <a:spcPts val="1417"/>
+              </a:spcBef>
+              <a:buClr>
+                <a:srgbClr val="000000"/>
+              </a:buClr>
+              <a:buSzPct val="45000"/>
+              <a:buFont typeface="Wingdings" charset="2"/>
+              <a:buChar char=""/>
+            </a:pPr>
+            <a:r>
+              <a:rPr b="0" lang="en-US" sz="3200" spc="-1" strike="noStrike">
+                <a:latin typeface="Arial"/>
+              </a:rPr>
+              <a:t>Corruption rate of  2.0 %</a:t>
+            </a:r>
+            <a:endParaRPr b="0" lang="en-US" sz="3200" spc="-1" strike="noStrike">
+              <a:latin typeface="Arial"/>
+            </a:endParaRPr>
+          </a:p>
+          <a:p>
+            <a:pPr marL="432000" indent="-324000">
+              <a:spcBef>
+                <a:spcPts val="1417"/>
+              </a:spcBef>
+              <a:buClr>
+                <a:srgbClr val="000000"/>
+              </a:buClr>
+              <a:buSzPct val="45000"/>
+              <a:buFont typeface="Wingdings" charset="2"/>
+              <a:buChar char=""/>
+            </a:pPr>
+            <a:r>
+              <a:rPr b="0" lang="en-US" sz="3200" spc="-1" strike="noStrike">
+                <a:latin typeface="Arial"/>
+              </a:rPr>
+              <a:t>Corruption rate of  2.57 %</a:t>
+            </a:r>
             <a:endParaRPr b="0" lang="en-US" sz="3200" spc="-1" strike="noStrike">
               <a:latin typeface="Arial"/>
             </a:endParaRPr>
@@ -2480,7 +2455,7 @@
       </p:sp>
       <p:pic>
         <p:nvPicPr>
-          <p:cNvPr id="97" name="" descr=""/>
+          <p:cNvPr id="90" name="" descr=""/>
           <p:cNvPicPr/>
           <p:nvPr/>
         </p:nvPicPr>
@@ -2490,8 +2465,8 @@
         </p:blipFill>
         <p:spPr>
           <a:xfrm>
-            <a:off x="504000" y="1402560"/>
-            <a:ext cx="4238280" cy="3352320"/>
+            <a:off x="182880" y="1013760"/>
+            <a:ext cx="3383280" cy="2407680"/>
           </a:xfrm>
           <a:prstGeom prst="rect">
             <a:avLst/>
@@ -2503,7 +2478,7 @@
       </p:pic>
       <p:pic>
         <p:nvPicPr>
-          <p:cNvPr id="98" name="" descr=""/>
+          <p:cNvPr id="91" name="" descr=""/>
           <p:cNvPicPr/>
           <p:nvPr/>
         </p:nvPicPr>
@@ -2513,8 +2488,31 @@
         </p:blipFill>
         <p:spPr>
           <a:xfrm>
-            <a:off x="5213520" y="1326600"/>
-            <a:ext cx="4362120" cy="3295440"/>
+            <a:off x="5577840" y="1005840"/>
+            <a:ext cx="3410280" cy="2468880"/>
+          </a:xfrm>
+          <a:prstGeom prst="rect">
+            <a:avLst/>
+          </a:prstGeom>
+          <a:ln>
+            <a:noFill/>
+          </a:ln>
+        </p:spPr>
+      </p:pic>
+      <p:pic>
+        <p:nvPicPr>
+          <p:cNvPr id="92" name="" descr=""/>
+          <p:cNvPicPr/>
+          <p:nvPr/>
+        </p:nvPicPr>
+        <p:blipFill>
+          <a:blip r:embed="rId3"/>
+          <a:stretch/>
+        </p:blipFill>
+        <p:spPr>
+          <a:xfrm>
+            <a:off x="2943360" y="3383280"/>
+            <a:ext cx="3366000" cy="2258280"/>
           </a:xfrm>
           <a:prstGeom prst="rect">
             <a:avLst/>
@@ -2575,14 +2573,14 @@
       </p:grpSpPr>
       <p:sp>
         <p:nvSpPr>
-          <p:cNvPr id="99" name="TextShape 1"/>
+          <p:cNvPr id="93" name="TextShape 1"/>
           <p:cNvSpPr txBox="1"/>
           <p:nvPr/>
         </p:nvSpPr>
         <p:spPr>
           <a:xfrm>
-            <a:off x="504000" y="74160"/>
-            <a:ext cx="9071640" cy="1250280"/>
+            <a:off x="504000" y="226080"/>
+            <a:ext cx="9071640" cy="946440"/>
           </a:xfrm>
           <a:prstGeom prst="rect">
             <a:avLst/>
@@ -2596,12 +2594,6 @@
           <a:bodyPr lIns="0" rIns="0" tIns="0" bIns="0" anchor="ctr"/>
           <a:p>
             <a:pPr algn="ctr"/>
-            <a:r>
-              <a:rPr b="0" lang="en-US" sz="4400" spc="-1" strike="noStrike">
-                <a:latin typeface="Arial"/>
-              </a:rPr>
-              <a:t>Unchanged Failed Bytes 1 Month vs 3 Months</a:t>
-            </a:r>
             <a:endParaRPr b="0" lang="en-US" sz="4400" spc="-1" strike="noStrike">
               <a:latin typeface="Arial"/>
             </a:endParaRPr>
@@ -2610,7 +2602,7 @@
       </p:sp>
       <p:sp>
         <p:nvSpPr>
-          <p:cNvPr id="100" name="TextShape 2"/>
+          <p:cNvPr id="94" name="TextShape 2"/>
           <p:cNvSpPr txBox="1"/>
           <p:nvPr/>
         </p:nvSpPr>
@@ -2640,7 +2632,7 @@
       </p:sp>
       <p:pic>
         <p:nvPicPr>
-          <p:cNvPr id="101" name="" descr=""/>
+          <p:cNvPr id="95" name="" descr=""/>
           <p:cNvPicPr/>
           <p:nvPr/>
         </p:nvPicPr>
@@ -2650,8 +2642,8 @@
         </p:blipFill>
         <p:spPr>
           <a:xfrm>
-            <a:off x="181440" y="1371600"/>
-            <a:ext cx="4390560" cy="3323880"/>
+            <a:off x="274320" y="1463040"/>
+            <a:ext cx="4352400" cy="2962080"/>
           </a:xfrm>
           <a:prstGeom prst="rect">
             <a:avLst/>
@@ -2663,7 +2655,7 @@
       </p:pic>
       <p:pic>
         <p:nvPicPr>
-          <p:cNvPr id="102" name="" descr=""/>
+          <p:cNvPr id="96" name="" descr=""/>
           <p:cNvPicPr/>
           <p:nvPr/>
         </p:nvPicPr>
@@ -2673,8 +2665,8 @@
         </p:blipFill>
         <p:spPr>
           <a:xfrm>
-            <a:off x="5029200" y="1326600"/>
-            <a:ext cx="4333680" cy="3228480"/>
+            <a:off x="5050440" y="1345320"/>
+            <a:ext cx="4276440" cy="2952360"/>
           </a:xfrm>
           <a:prstGeom prst="rect">
             <a:avLst/>
@@ -2735,14 +2727,14 @@
       </p:grpSpPr>
       <p:sp>
         <p:nvSpPr>
-          <p:cNvPr id="103" name="TextShape 1"/>
+          <p:cNvPr id="97" name="TextShape 1"/>
           <p:cNvSpPr txBox="1"/>
           <p:nvPr/>
         </p:nvSpPr>
         <p:spPr>
           <a:xfrm>
-            <a:off x="504000" y="226080"/>
-            <a:ext cx="9071640" cy="946440"/>
+            <a:off x="504000" y="74160"/>
+            <a:ext cx="9071640" cy="1250280"/>
           </a:xfrm>
           <a:prstGeom prst="rect">
             <a:avLst/>
@@ -2760,7 +2752,7 @@
               <a:rPr b="0" lang="en-US" sz="4400" spc="-1" strike="noStrike">
                 <a:latin typeface="Arial"/>
               </a:rPr>
-              <a:t>MSB and LSB Pages</a:t>
+              <a:t>Fixed Failed Bytes 1 Month vs 3 Months</a:t>
             </a:r>
             <a:endParaRPr b="0" lang="en-US" sz="4400" spc="-1" strike="noStrike">
               <a:latin typeface="Arial"/>
@@ -2770,7 +2762,7 @@
       </p:sp>
       <p:sp>
         <p:nvSpPr>
-          <p:cNvPr id="104" name="TextShape 2"/>
+          <p:cNvPr id="98" name="TextShape 2"/>
           <p:cNvSpPr txBox="1"/>
           <p:nvPr/>
         </p:nvSpPr>
@@ -2800,7 +2792,7 @@
       </p:sp>
       <p:pic>
         <p:nvPicPr>
-          <p:cNvPr id="105" name="" descr=""/>
+          <p:cNvPr id="99" name="" descr=""/>
           <p:cNvPicPr/>
           <p:nvPr/>
         </p:nvPicPr>
@@ -2810,8 +2802,8 @@
         </p:blipFill>
         <p:spPr>
           <a:xfrm>
-            <a:off x="867240" y="1554480"/>
-            <a:ext cx="4161960" cy="2933280"/>
+            <a:off x="504000" y="1522440"/>
+            <a:ext cx="4314600" cy="3323880"/>
           </a:xfrm>
           <a:prstGeom prst="rect">
             <a:avLst/>
@@ -2823,7 +2815,7 @@
       </p:pic>
       <p:pic>
         <p:nvPicPr>
-          <p:cNvPr id="106" name="" descr=""/>
+          <p:cNvPr id="100" name="" descr=""/>
           <p:cNvPicPr/>
           <p:nvPr/>
         </p:nvPicPr>
@@ -2833,8 +2825,8 @@
         </p:blipFill>
         <p:spPr>
           <a:xfrm>
-            <a:off x="5534280" y="1645920"/>
-            <a:ext cx="4066920" cy="3018960"/>
+            <a:off x="5239080" y="1488240"/>
+            <a:ext cx="4362120" cy="3266640"/>
           </a:xfrm>
           <a:prstGeom prst="rect">
             <a:avLst/>
@@ -2853,6 +2845,685 @@
           <p:childTnLst>
             <p:seq>
               <p:cTn id="30" dur="indefinite" nodeType="mainSeq"/>
+              <p:prevCondLst>
+                <p:cond delay="0" evt="onPrev">
+                  <p:tgtEl>
+                    <p:sldTgt/>
+                  </p:tgtEl>
+                </p:cond>
+              </p:prevCondLst>
+              <p:nextCondLst>
+                <p:cond delay="0" evt="onNext">
+                  <p:tgtEl>
+                    <p:sldTgt/>
+                  </p:tgtEl>
+                </p:cond>
+              </p:nextCondLst>
+            </p:seq>
+          </p:childTnLst>
+        </p:cTn>
+      </p:par>
+    </p:tnLst>
+  </p:timing>
+</p:sld>
+</file>
+
+<file path=ppt/slides/slide16.xml><?xml version="1.0" encoding="utf-8"?>
+<p:sld xmlns:a="http://schemas.openxmlformats.org/drawingml/2006/main" xmlns:p="http://schemas.openxmlformats.org/presentationml/2006/main" xmlns:r="http://schemas.openxmlformats.org/officeDocument/2006/relationships" xmlns:p14="http://schemas.microsoft.com/office/powerpoint/2010/main" xmlns:p15="http://schemas.microsoft.com/office/powerpoint/2012/main" xmlns:mc="http://schemas.openxmlformats.org/markup-compatibility/2006">
+  <p:cSld>
+    <p:spTree>
+      <p:nvGrpSpPr>
+        <p:cNvPr id="1" name=""/>
+        <p:cNvGrpSpPr/>
+        <p:nvPr/>
+      </p:nvGrpSpPr>
+      <p:grpSpPr>
+        <a:xfrm>
+          <a:off x="0" y="0"/>
+          <a:ext cx="0" cy="0"/>
+          <a:chOff x="0" y="0"/>
+          <a:chExt cx="0" cy="0"/>
+        </a:xfrm>
+      </p:grpSpPr>
+      <p:sp>
+        <p:nvSpPr>
+          <p:cNvPr id="101" name="TextShape 1"/>
+          <p:cNvSpPr txBox="1"/>
+          <p:nvPr/>
+        </p:nvSpPr>
+        <p:spPr>
+          <a:xfrm>
+            <a:off x="504000" y="74160"/>
+            <a:ext cx="9071640" cy="1250280"/>
+          </a:xfrm>
+          <a:prstGeom prst="rect">
+            <a:avLst/>
+          </a:prstGeom>
+          <a:noFill/>
+          <a:ln>
+            <a:noFill/>
+          </a:ln>
+        </p:spPr>
+        <p:txBody>
+          <a:bodyPr lIns="0" rIns="0" tIns="0" bIns="0" anchor="ctr"/>
+          <a:p>
+            <a:pPr algn="ctr"/>
+            <a:r>
+              <a:rPr b="0" lang="en-US" sz="4400" spc="-1" strike="noStrike">
+                <a:latin typeface="Arial"/>
+              </a:rPr>
+              <a:t>New Failed Bytes 1 Month vs 3 Months</a:t>
+            </a:r>
+            <a:endParaRPr b="0" lang="en-US" sz="4400" spc="-1" strike="noStrike">
+              <a:latin typeface="Arial"/>
+            </a:endParaRPr>
+          </a:p>
+        </p:txBody>
+      </p:sp>
+      <p:sp>
+        <p:nvSpPr>
+          <p:cNvPr id="102" name="TextShape 2"/>
+          <p:cNvSpPr txBox="1"/>
+          <p:nvPr/>
+        </p:nvSpPr>
+        <p:spPr>
+          <a:xfrm>
+            <a:off x="504000" y="1326600"/>
+            <a:ext cx="9071640" cy="3288240"/>
+          </a:xfrm>
+          <a:prstGeom prst="rect">
+            <a:avLst/>
+          </a:prstGeom>
+          <a:noFill/>
+          <a:ln>
+            <a:noFill/>
+          </a:ln>
+        </p:spPr>
+        <p:txBody>
+          <a:bodyPr lIns="0" rIns="0" tIns="0" bIns="0">
+            <a:normAutofit/>
+          </a:bodyPr>
+          <a:p>
+            <a:endParaRPr b="0" lang="en-US" sz="3200" spc="-1" strike="noStrike">
+              <a:latin typeface="Arial"/>
+            </a:endParaRPr>
+          </a:p>
+        </p:txBody>
+      </p:sp>
+      <p:pic>
+        <p:nvPicPr>
+          <p:cNvPr id="103" name="" descr=""/>
+          <p:cNvPicPr/>
+          <p:nvPr/>
+        </p:nvPicPr>
+        <p:blipFill>
+          <a:blip r:embed="rId1"/>
+          <a:stretch/>
+        </p:blipFill>
+        <p:spPr>
+          <a:xfrm>
+            <a:off x="504000" y="1402560"/>
+            <a:ext cx="4238280" cy="3352320"/>
+          </a:xfrm>
+          <a:prstGeom prst="rect">
+            <a:avLst/>
+          </a:prstGeom>
+          <a:ln>
+            <a:noFill/>
+          </a:ln>
+        </p:spPr>
+      </p:pic>
+      <p:pic>
+        <p:nvPicPr>
+          <p:cNvPr id="104" name="" descr=""/>
+          <p:cNvPicPr/>
+          <p:nvPr/>
+        </p:nvPicPr>
+        <p:blipFill>
+          <a:blip r:embed="rId2"/>
+          <a:stretch/>
+        </p:blipFill>
+        <p:spPr>
+          <a:xfrm>
+            <a:off x="5213520" y="1326600"/>
+            <a:ext cx="4362120" cy="3295440"/>
+          </a:xfrm>
+          <a:prstGeom prst="rect">
+            <a:avLst/>
+          </a:prstGeom>
+          <a:ln>
+            <a:noFill/>
+          </a:ln>
+        </p:spPr>
+      </p:pic>
+    </p:spTree>
+  </p:cSld>
+  <p:timing>
+    <p:tnLst>
+      <p:par>
+        <p:cTn id="31" dur="indefinite" restart="never" nodeType="tmRoot">
+          <p:childTnLst>
+            <p:seq>
+              <p:cTn id="32" dur="indefinite" nodeType="mainSeq"/>
+              <p:prevCondLst>
+                <p:cond delay="0" evt="onPrev">
+                  <p:tgtEl>
+                    <p:sldTgt/>
+                  </p:tgtEl>
+                </p:cond>
+              </p:prevCondLst>
+              <p:nextCondLst>
+                <p:cond delay="0" evt="onNext">
+                  <p:tgtEl>
+                    <p:sldTgt/>
+                  </p:tgtEl>
+                </p:cond>
+              </p:nextCondLst>
+            </p:seq>
+          </p:childTnLst>
+        </p:cTn>
+      </p:par>
+    </p:tnLst>
+  </p:timing>
+</p:sld>
+</file>
+
+<file path=ppt/slides/slide17.xml><?xml version="1.0" encoding="utf-8"?>
+<p:sld xmlns:a="http://schemas.openxmlformats.org/drawingml/2006/main" xmlns:p="http://schemas.openxmlformats.org/presentationml/2006/main" xmlns:r="http://schemas.openxmlformats.org/officeDocument/2006/relationships" xmlns:p14="http://schemas.microsoft.com/office/powerpoint/2010/main" xmlns:p15="http://schemas.microsoft.com/office/powerpoint/2012/main" xmlns:mc="http://schemas.openxmlformats.org/markup-compatibility/2006">
+  <p:cSld>
+    <p:spTree>
+      <p:nvGrpSpPr>
+        <p:cNvPr id="1" name=""/>
+        <p:cNvGrpSpPr/>
+        <p:nvPr/>
+      </p:nvGrpSpPr>
+      <p:grpSpPr>
+        <a:xfrm>
+          <a:off x="0" y="0"/>
+          <a:ext cx="0" cy="0"/>
+          <a:chOff x="0" y="0"/>
+          <a:chExt cx="0" cy="0"/>
+        </a:xfrm>
+      </p:grpSpPr>
+      <p:sp>
+        <p:nvSpPr>
+          <p:cNvPr id="105" name="TextShape 1"/>
+          <p:cNvSpPr txBox="1"/>
+          <p:nvPr/>
+        </p:nvSpPr>
+        <p:spPr>
+          <a:xfrm>
+            <a:off x="504000" y="74160"/>
+            <a:ext cx="9071640" cy="1250280"/>
+          </a:xfrm>
+          <a:prstGeom prst="rect">
+            <a:avLst/>
+          </a:prstGeom>
+          <a:noFill/>
+          <a:ln>
+            <a:noFill/>
+          </a:ln>
+        </p:spPr>
+        <p:txBody>
+          <a:bodyPr lIns="0" rIns="0" tIns="0" bIns="0" anchor="ctr"/>
+          <a:p>
+            <a:pPr algn="ctr"/>
+            <a:r>
+              <a:rPr b="0" lang="en-US" sz="4400" spc="-1" strike="noStrike">
+                <a:latin typeface="Arial"/>
+              </a:rPr>
+              <a:t>Unchanged Failed Bytes 1 Month vs 3 Months</a:t>
+            </a:r>
+            <a:endParaRPr b="0" lang="en-US" sz="4400" spc="-1" strike="noStrike">
+              <a:latin typeface="Arial"/>
+            </a:endParaRPr>
+          </a:p>
+        </p:txBody>
+      </p:sp>
+      <p:sp>
+        <p:nvSpPr>
+          <p:cNvPr id="106" name="TextShape 2"/>
+          <p:cNvSpPr txBox="1"/>
+          <p:nvPr/>
+        </p:nvSpPr>
+        <p:spPr>
+          <a:xfrm>
+            <a:off x="504000" y="1326600"/>
+            <a:ext cx="9071640" cy="3288240"/>
+          </a:xfrm>
+          <a:prstGeom prst="rect">
+            <a:avLst/>
+          </a:prstGeom>
+          <a:noFill/>
+          <a:ln>
+            <a:noFill/>
+          </a:ln>
+        </p:spPr>
+        <p:txBody>
+          <a:bodyPr lIns="0" rIns="0" tIns="0" bIns="0">
+            <a:normAutofit/>
+          </a:bodyPr>
+          <a:p>
+            <a:endParaRPr b="0" lang="en-US" sz="3200" spc="-1" strike="noStrike">
+              <a:latin typeface="Arial"/>
+            </a:endParaRPr>
+          </a:p>
+        </p:txBody>
+      </p:sp>
+      <p:pic>
+        <p:nvPicPr>
+          <p:cNvPr id="107" name="" descr=""/>
+          <p:cNvPicPr/>
+          <p:nvPr/>
+        </p:nvPicPr>
+        <p:blipFill>
+          <a:blip r:embed="rId1"/>
+          <a:stretch/>
+        </p:blipFill>
+        <p:spPr>
+          <a:xfrm>
+            <a:off x="181440" y="1371600"/>
+            <a:ext cx="4390560" cy="3323880"/>
+          </a:xfrm>
+          <a:prstGeom prst="rect">
+            <a:avLst/>
+          </a:prstGeom>
+          <a:ln>
+            <a:noFill/>
+          </a:ln>
+        </p:spPr>
+      </p:pic>
+      <p:pic>
+        <p:nvPicPr>
+          <p:cNvPr id="108" name="" descr=""/>
+          <p:cNvPicPr/>
+          <p:nvPr/>
+        </p:nvPicPr>
+        <p:blipFill>
+          <a:blip r:embed="rId2"/>
+          <a:stretch/>
+        </p:blipFill>
+        <p:spPr>
+          <a:xfrm>
+            <a:off x="5029200" y="1326600"/>
+            <a:ext cx="4333680" cy="3228480"/>
+          </a:xfrm>
+          <a:prstGeom prst="rect">
+            <a:avLst/>
+          </a:prstGeom>
+          <a:ln>
+            <a:noFill/>
+          </a:ln>
+        </p:spPr>
+      </p:pic>
+    </p:spTree>
+  </p:cSld>
+  <p:timing>
+    <p:tnLst>
+      <p:par>
+        <p:cTn id="33" dur="indefinite" restart="never" nodeType="tmRoot">
+          <p:childTnLst>
+            <p:seq>
+              <p:cTn id="34" dur="indefinite" nodeType="mainSeq"/>
+              <p:prevCondLst>
+                <p:cond delay="0" evt="onPrev">
+                  <p:tgtEl>
+                    <p:sldTgt/>
+                  </p:tgtEl>
+                </p:cond>
+              </p:prevCondLst>
+              <p:nextCondLst>
+                <p:cond delay="0" evt="onNext">
+                  <p:tgtEl>
+                    <p:sldTgt/>
+                  </p:tgtEl>
+                </p:cond>
+              </p:nextCondLst>
+            </p:seq>
+          </p:childTnLst>
+        </p:cTn>
+      </p:par>
+    </p:tnLst>
+  </p:timing>
+</p:sld>
+</file>
+
+<file path=ppt/slides/slide18.xml><?xml version="1.0" encoding="utf-8"?>
+<p:sld xmlns:a="http://schemas.openxmlformats.org/drawingml/2006/main" xmlns:p="http://schemas.openxmlformats.org/presentationml/2006/main" xmlns:r="http://schemas.openxmlformats.org/officeDocument/2006/relationships" xmlns:p14="http://schemas.microsoft.com/office/powerpoint/2010/main" xmlns:p15="http://schemas.microsoft.com/office/powerpoint/2012/main" xmlns:mc="http://schemas.openxmlformats.org/markup-compatibility/2006">
+  <p:cSld>
+    <p:spTree>
+      <p:nvGrpSpPr>
+        <p:cNvPr id="1" name=""/>
+        <p:cNvGrpSpPr/>
+        <p:nvPr/>
+      </p:nvGrpSpPr>
+      <p:grpSpPr>
+        <a:xfrm>
+          <a:off x="0" y="0"/>
+          <a:ext cx="0" cy="0"/>
+          <a:chOff x="0" y="0"/>
+          <a:chExt cx="0" cy="0"/>
+        </a:xfrm>
+      </p:grpSpPr>
+      <p:sp>
+        <p:nvSpPr>
+          <p:cNvPr id="109" name="TextShape 1"/>
+          <p:cNvSpPr txBox="1"/>
+          <p:nvPr/>
+        </p:nvSpPr>
+        <p:spPr>
+          <a:xfrm>
+            <a:off x="504000" y="226080"/>
+            <a:ext cx="9071640" cy="946440"/>
+          </a:xfrm>
+          <a:prstGeom prst="rect">
+            <a:avLst/>
+          </a:prstGeom>
+          <a:noFill/>
+          <a:ln>
+            <a:noFill/>
+          </a:ln>
+        </p:spPr>
+        <p:txBody>
+          <a:bodyPr lIns="0" rIns="0" tIns="0" bIns="0" anchor="ctr"/>
+          <a:p>
+            <a:pPr algn="ctr"/>
+            <a:r>
+              <a:rPr b="0" lang="en-US" sz="4400" spc="-1" strike="noStrike">
+                <a:latin typeface="Arial"/>
+              </a:rPr>
+              <a:t>MSB and LSB Pages</a:t>
+            </a:r>
+            <a:endParaRPr b="0" lang="en-US" sz="4400" spc="-1" strike="noStrike">
+              <a:latin typeface="Arial"/>
+            </a:endParaRPr>
+          </a:p>
+        </p:txBody>
+      </p:sp>
+      <p:sp>
+        <p:nvSpPr>
+          <p:cNvPr id="110" name="TextShape 2"/>
+          <p:cNvSpPr txBox="1"/>
+          <p:nvPr/>
+        </p:nvSpPr>
+        <p:spPr>
+          <a:xfrm>
+            <a:off x="504000" y="1326600"/>
+            <a:ext cx="9071640" cy="3288240"/>
+          </a:xfrm>
+          <a:prstGeom prst="rect">
+            <a:avLst/>
+          </a:prstGeom>
+          <a:noFill/>
+          <a:ln>
+            <a:noFill/>
+          </a:ln>
+        </p:spPr>
+        <p:txBody>
+          <a:bodyPr lIns="0" rIns="0" tIns="0" bIns="0">
+            <a:normAutofit/>
+          </a:bodyPr>
+          <a:p>
+            <a:endParaRPr b="0" lang="en-US" sz="3200" spc="-1" strike="noStrike">
+              <a:latin typeface="Arial"/>
+            </a:endParaRPr>
+          </a:p>
+        </p:txBody>
+      </p:sp>
+      <p:pic>
+        <p:nvPicPr>
+          <p:cNvPr id="111" name="" descr=""/>
+          <p:cNvPicPr/>
+          <p:nvPr/>
+        </p:nvPicPr>
+        <p:blipFill>
+          <a:blip r:embed="rId1"/>
+          <a:stretch/>
+        </p:blipFill>
+        <p:spPr>
+          <a:xfrm>
+            <a:off x="867240" y="1554480"/>
+            <a:ext cx="4161960" cy="2933280"/>
+          </a:xfrm>
+          <a:prstGeom prst="rect">
+            <a:avLst/>
+          </a:prstGeom>
+          <a:ln>
+            <a:noFill/>
+          </a:ln>
+        </p:spPr>
+      </p:pic>
+      <p:pic>
+        <p:nvPicPr>
+          <p:cNvPr id="112" name="" descr=""/>
+          <p:cNvPicPr/>
+          <p:nvPr/>
+        </p:nvPicPr>
+        <p:blipFill>
+          <a:blip r:embed="rId2"/>
+          <a:stretch/>
+        </p:blipFill>
+        <p:spPr>
+          <a:xfrm>
+            <a:off x="5534280" y="1645920"/>
+            <a:ext cx="4066920" cy="3018960"/>
+          </a:xfrm>
+          <a:prstGeom prst="rect">
+            <a:avLst/>
+          </a:prstGeom>
+          <a:ln>
+            <a:noFill/>
+          </a:ln>
+        </p:spPr>
+      </p:pic>
+    </p:spTree>
+  </p:cSld>
+  <p:timing>
+    <p:tnLst>
+      <p:par>
+        <p:cTn id="35" dur="indefinite" restart="never" nodeType="tmRoot">
+          <p:childTnLst>
+            <p:seq>
+              <p:cTn id="36" dur="indefinite" nodeType="mainSeq"/>
+              <p:prevCondLst>
+                <p:cond delay="0" evt="onPrev">
+                  <p:tgtEl>
+                    <p:sldTgt/>
+                  </p:tgtEl>
+                </p:cond>
+              </p:prevCondLst>
+              <p:nextCondLst>
+                <p:cond delay="0" evt="onNext">
+                  <p:tgtEl>
+                    <p:sldTgt/>
+                  </p:tgtEl>
+                </p:cond>
+              </p:nextCondLst>
+            </p:seq>
+          </p:childTnLst>
+        </p:cTn>
+      </p:par>
+    </p:tnLst>
+  </p:timing>
+</p:sld>
+</file>
+
+<file path=ppt/slides/slide19.xml><?xml version="1.0" encoding="utf-8"?>
+<p:sld xmlns:a="http://schemas.openxmlformats.org/drawingml/2006/main" xmlns:p="http://schemas.openxmlformats.org/presentationml/2006/main" xmlns:r="http://schemas.openxmlformats.org/officeDocument/2006/relationships" xmlns:p14="http://schemas.microsoft.com/office/powerpoint/2010/main" xmlns:p15="http://schemas.microsoft.com/office/powerpoint/2012/main" xmlns:mc="http://schemas.openxmlformats.org/markup-compatibility/2006">
+  <p:cSld>
+    <p:spTree>
+      <p:nvGrpSpPr>
+        <p:cNvPr id="1" name=""/>
+        <p:cNvGrpSpPr/>
+        <p:nvPr/>
+      </p:nvGrpSpPr>
+      <p:grpSpPr>
+        <a:xfrm>
+          <a:off x="0" y="0"/>
+          <a:ext cx="0" cy="0"/>
+          <a:chOff x="0" y="0"/>
+          <a:chExt cx="0" cy="0"/>
+        </a:xfrm>
+      </p:grpSpPr>
+      <p:sp>
+        <p:nvSpPr>
+          <p:cNvPr id="113" name="TextShape 1"/>
+          <p:cNvSpPr txBox="1"/>
+          <p:nvPr/>
+        </p:nvSpPr>
+        <p:spPr>
+          <a:xfrm>
+            <a:off x="504000" y="226080"/>
+            <a:ext cx="9071640" cy="946440"/>
+          </a:xfrm>
+          <a:prstGeom prst="rect">
+            <a:avLst/>
+          </a:prstGeom>
+          <a:noFill/>
+          <a:ln>
+            <a:noFill/>
+          </a:ln>
+        </p:spPr>
+        <p:txBody>
+          <a:bodyPr lIns="0" rIns="0" tIns="0" bIns="0" anchor="ctr"/>
+          <a:p>
+            <a:pPr algn="ctr"/>
+            <a:endParaRPr b="0" lang="en-US" sz="4400" spc="-1" strike="noStrike">
+              <a:latin typeface="Arial"/>
+            </a:endParaRPr>
+          </a:p>
+        </p:txBody>
+      </p:sp>
+      <p:sp>
+        <p:nvSpPr>
+          <p:cNvPr id="114" name="TextShape 2"/>
+          <p:cNvSpPr txBox="1"/>
+          <p:nvPr/>
+        </p:nvSpPr>
+        <p:spPr>
+          <a:xfrm>
+            <a:off x="504000" y="1326600"/>
+            <a:ext cx="9071640" cy="3288240"/>
+          </a:xfrm>
+          <a:prstGeom prst="rect">
+            <a:avLst/>
+          </a:prstGeom>
+          <a:noFill/>
+          <a:ln>
+            <a:noFill/>
+          </a:ln>
+        </p:spPr>
+        <p:txBody>
+          <a:bodyPr lIns="0" rIns="0" tIns="0" bIns="0">
+            <a:normAutofit/>
+          </a:bodyPr>
+          <a:p>
+            <a:endParaRPr b="0" lang="en-US" sz="3200" spc="-1" strike="noStrike">
+              <a:latin typeface="Arial"/>
+            </a:endParaRPr>
+          </a:p>
+        </p:txBody>
+      </p:sp>
+      <p:pic>
+        <p:nvPicPr>
+          <p:cNvPr id="115" name="" descr=""/>
+          <p:cNvPicPr/>
+          <p:nvPr/>
+        </p:nvPicPr>
+        <p:blipFill>
+          <a:blip r:embed="rId1"/>
+          <a:stretch/>
+        </p:blipFill>
+        <p:spPr>
+          <a:xfrm>
+            <a:off x="2011680" y="226080"/>
+            <a:ext cx="5717520" cy="5019480"/>
+          </a:xfrm>
+          <a:prstGeom prst="rect">
+            <a:avLst/>
+          </a:prstGeom>
+          <a:ln>
+            <a:noFill/>
+          </a:ln>
+        </p:spPr>
+      </p:pic>
+      <p:sp>
+        <p:nvSpPr>
+          <p:cNvPr id="116" name="TextShape 3"/>
+          <p:cNvSpPr txBox="1"/>
+          <p:nvPr/>
+        </p:nvSpPr>
+        <p:spPr>
+          <a:xfrm>
+            <a:off x="2194560" y="2305440"/>
+            <a:ext cx="676080" cy="346320"/>
+          </a:xfrm>
+          <a:prstGeom prst="rect">
+            <a:avLst/>
+          </a:prstGeom>
+          <a:noFill/>
+          <a:ln>
+            <a:noFill/>
+          </a:ln>
+        </p:spPr>
+        <p:txBody>
+          <a:bodyPr lIns="90000" rIns="90000" tIns="45000" bIns="45000"/>
+          <a:p>
+            <a:r>
+              <a:rPr b="0" lang="en-US" sz="1800" spc="-1" strike="noStrike">
+                <a:latin typeface="Arial"/>
+              </a:rPr>
+              <a:t>MSB</a:t>
+            </a:r>
+            <a:endParaRPr b="0" lang="en-US" sz="1800" spc="-1" strike="noStrike">
+              <a:latin typeface="Arial"/>
+            </a:endParaRPr>
+          </a:p>
+        </p:txBody>
+      </p:sp>
+      <p:sp>
+        <p:nvSpPr>
+          <p:cNvPr id="117" name="TextShape 4"/>
+          <p:cNvSpPr txBox="1"/>
+          <p:nvPr/>
+        </p:nvSpPr>
+        <p:spPr>
+          <a:xfrm>
+            <a:off x="2926080" y="2122560"/>
+            <a:ext cx="612000" cy="346320"/>
+          </a:xfrm>
+          <a:prstGeom prst="rect">
+            <a:avLst/>
+          </a:prstGeom>
+          <a:noFill/>
+          <a:ln>
+            <a:noFill/>
+          </a:ln>
+        </p:spPr>
+        <p:txBody>
+          <a:bodyPr lIns="90000" rIns="90000" tIns="45000" bIns="45000"/>
+          <a:p>
+            <a:r>
+              <a:rPr b="0" lang="en-US" sz="1800" spc="-1" strike="noStrike">
+                <a:latin typeface="Arial"/>
+              </a:rPr>
+              <a:t>LSB</a:t>
+            </a:r>
+            <a:endParaRPr b="0" lang="en-US" sz="1800" spc="-1" strike="noStrike">
+              <a:latin typeface="Arial"/>
+            </a:endParaRPr>
+          </a:p>
+        </p:txBody>
+      </p:sp>
+    </p:spTree>
+  </p:cSld>
+  <p:timing>
+    <p:tnLst>
+      <p:par>
+        <p:cTn id="37" dur="indefinite" restart="never" nodeType="tmRoot">
+          <p:childTnLst>
+            <p:seq>
+              <p:cTn id="38" dur="indefinite" nodeType="mainSeq"/>
               <p:prevCondLst>
                 <p:cond delay="0" evt="onPrev">
                   <p:tgtEl>
@@ -2901,8 +3572,43 @@
         </p:nvSpPr>
         <p:spPr>
           <a:xfrm>
+            <a:off x="504000" y="226080"/>
+            <a:ext cx="9071640" cy="946440"/>
+          </a:xfrm>
+          <a:prstGeom prst="rect">
+            <a:avLst/>
+          </a:prstGeom>
+          <a:noFill/>
+          <a:ln>
+            <a:noFill/>
+          </a:ln>
+        </p:spPr>
+        <p:txBody>
+          <a:bodyPr lIns="0" rIns="0" tIns="0" bIns="0" anchor="ctr"/>
+          <a:p>
+            <a:pPr algn="ctr"/>
+            <a:r>
+              <a:rPr b="0" lang="en-US" sz="4400" spc="-1" strike="noStrike">
+                <a:latin typeface="Arial"/>
+              </a:rPr>
+              <a:t>Chip 0 and Chip 1 – 10krad</a:t>
+            </a:r>
+            <a:endParaRPr b="0" lang="en-US" sz="4400" spc="-1" strike="noStrike">
+              <a:latin typeface="Arial"/>
+            </a:endParaRPr>
+          </a:p>
+        </p:txBody>
+      </p:sp>
+      <p:sp>
+        <p:nvSpPr>
+          <p:cNvPr id="44" name="TextShape 2"/>
+          <p:cNvSpPr txBox="1"/>
+          <p:nvPr/>
+        </p:nvSpPr>
+        <p:spPr>
+          <a:xfrm>
             <a:off x="504000" y="1326600"/>
-            <a:ext cx="9071640" cy="3288240"/>
+            <a:ext cx="4890960" cy="3288240"/>
           </a:xfrm>
           <a:prstGeom prst="rect">
             <a:avLst/>
@@ -2917,6 +3623,45 @@
             <a:normAutofit/>
           </a:bodyPr>
           <a:p>
+            <a:pPr marL="432000" indent="-324000">
+              <a:spcBef>
+                <a:spcPts val="1417"/>
+              </a:spcBef>
+              <a:buClr>
+                <a:srgbClr val="000000"/>
+              </a:buClr>
+              <a:buSzPct val="45000"/>
+              <a:buFont typeface="Wingdings" charset="2"/>
+              <a:buChar char=""/>
+            </a:pPr>
+            <a:r>
+              <a:rPr b="0" lang="en-US" sz="3200" spc="-1" strike="noStrike">
+                <a:latin typeface="Arial"/>
+              </a:rPr>
+              <a:t>Relaxation effect is not consistent across all chips and blocks. </a:t>
+            </a:r>
+            <a:endParaRPr b="0" lang="en-US" sz="3200" spc="-1" strike="noStrike">
+              <a:latin typeface="Arial"/>
+            </a:endParaRPr>
+          </a:p>
+          <a:p>
+            <a:pPr marL="432000" indent="-324000">
+              <a:spcBef>
+                <a:spcPts val="1417"/>
+              </a:spcBef>
+              <a:buClr>
+                <a:srgbClr val="000000"/>
+              </a:buClr>
+              <a:buSzPct val="45000"/>
+              <a:buFont typeface="Wingdings" charset="2"/>
+              <a:buChar char=""/>
+            </a:pPr>
+            <a:r>
+              <a:rPr b="0" lang="en-US" sz="3200" spc="-1" strike="noStrike">
+                <a:latin typeface="Arial"/>
+              </a:rPr>
+              <a:t>Corruption rate may go up or down</a:t>
+            </a:r>
             <a:endParaRPr b="0" lang="en-US" sz="3200" spc="-1" strike="noStrike">
               <a:latin typeface="Arial"/>
             </a:endParaRPr>
@@ -2925,7 +3670,7 @@
       </p:sp>
       <p:pic>
         <p:nvPicPr>
-          <p:cNvPr id="44" name="" descr=""/>
+          <p:cNvPr id="45" name="" descr=""/>
           <p:cNvPicPr/>
           <p:nvPr/>
         </p:nvPicPr>
@@ -2935,77 +3680,8 @@
         </p:blipFill>
         <p:spPr>
           <a:xfrm>
-            <a:off x="4937040" y="64080"/>
-            <a:ext cx="4206960" cy="2804400"/>
-          </a:xfrm>
-          <a:prstGeom prst="rect">
-            <a:avLst/>
-          </a:prstGeom>
-          <a:ln>
-            <a:noFill/>
-          </a:ln>
-        </p:spPr>
-      </p:pic>
-      <p:pic>
-        <p:nvPicPr>
-          <p:cNvPr id="45" name="" descr=""/>
-          <p:cNvPicPr/>
-          <p:nvPr/>
-        </p:nvPicPr>
-        <p:blipFill>
-          <a:blip r:embed="rId2"/>
-          <a:stretch/>
-        </p:blipFill>
-        <p:spPr>
-          <a:xfrm>
-            <a:off x="5246280" y="2957040"/>
-            <a:ext cx="3897720" cy="2598480"/>
-          </a:xfrm>
-          <a:prstGeom prst="rect">
-            <a:avLst/>
-          </a:prstGeom>
-          <a:ln>
-            <a:noFill/>
-          </a:ln>
-        </p:spPr>
-      </p:pic>
-      <p:pic>
-        <p:nvPicPr>
-          <p:cNvPr id="46" name="" descr=""/>
-          <p:cNvPicPr/>
-          <p:nvPr/>
-        </p:nvPicPr>
-        <p:blipFill>
-          <a:blip r:embed="rId3"/>
-          <a:stretch/>
-        </p:blipFill>
-        <p:spPr>
-          <a:xfrm>
-            <a:off x="392760" y="3070080"/>
-            <a:ext cx="3630600" cy="2420280"/>
-          </a:xfrm>
-          <a:prstGeom prst="rect">
-            <a:avLst/>
-          </a:prstGeom>
-          <a:ln>
-            <a:noFill/>
-          </a:ln>
-        </p:spPr>
-      </p:pic>
-      <p:pic>
-        <p:nvPicPr>
-          <p:cNvPr id="47" name="" descr=""/>
-          <p:cNvPicPr/>
-          <p:nvPr/>
-        </p:nvPicPr>
-        <p:blipFill>
-          <a:blip r:embed="rId4"/>
-          <a:stretch/>
-        </p:blipFill>
-        <p:spPr>
-          <a:xfrm>
-            <a:off x="90720" y="88200"/>
-            <a:ext cx="3932640" cy="2621520"/>
+            <a:off x="5394960" y="1436760"/>
+            <a:ext cx="4285800" cy="2952360"/>
           </a:xfrm>
           <a:prstGeom prst="rect">
             <a:avLst/>
@@ -3066,36 +3742,7 @@
       </p:grpSpPr>
       <p:sp>
         <p:nvSpPr>
-          <p:cNvPr id="48" name="TextShape 1"/>
-          <p:cNvSpPr txBox="1"/>
-          <p:nvPr/>
-        </p:nvSpPr>
-        <p:spPr>
-          <a:xfrm>
-            <a:off x="504000" y="226080"/>
-            <a:ext cx="9071640" cy="946440"/>
-          </a:xfrm>
-          <a:prstGeom prst="rect">
-            <a:avLst/>
-          </a:prstGeom>
-          <a:noFill/>
-          <a:ln>
-            <a:noFill/>
-          </a:ln>
-        </p:spPr>
-        <p:txBody>
-          <a:bodyPr lIns="0" rIns="0" tIns="0" bIns="0" anchor="ctr"/>
-          <a:p>
-            <a:pPr algn="ctr"/>
-            <a:endParaRPr b="0" lang="en-US" sz="4400" spc="-1" strike="noStrike">
-              <a:latin typeface="Arial"/>
-            </a:endParaRPr>
-          </a:p>
-        </p:txBody>
-      </p:sp>
-      <p:sp>
-        <p:nvSpPr>
-          <p:cNvPr id="49" name="TextShape 2"/>
+          <p:cNvPr id="46" name="TextShape 1"/>
           <p:cNvSpPr txBox="1"/>
           <p:nvPr/>
         </p:nvSpPr>
@@ -3125,7 +3772,7 @@
       </p:sp>
       <p:pic>
         <p:nvPicPr>
-          <p:cNvPr id="50" name="" descr=""/>
+          <p:cNvPr id="47" name="" descr=""/>
           <p:cNvPicPr/>
           <p:nvPr/>
         </p:nvPicPr>
@@ -3135,8 +3782,8 @@
         </p:blipFill>
         <p:spPr>
           <a:xfrm>
-            <a:off x="274320" y="1383480"/>
-            <a:ext cx="4453560" cy="3131640"/>
+            <a:off x="4937040" y="64080"/>
+            <a:ext cx="4206960" cy="2804400"/>
           </a:xfrm>
           <a:prstGeom prst="rect">
             <a:avLst/>
@@ -3148,7 +3795,7 @@
       </p:pic>
       <p:pic>
         <p:nvPicPr>
-          <p:cNvPr id="51" name="" descr=""/>
+          <p:cNvPr id="48" name="" descr=""/>
           <p:cNvPicPr/>
           <p:nvPr/>
         </p:nvPicPr>
@@ -3158,8 +3805,31 @@
         </p:blipFill>
         <p:spPr>
           <a:xfrm>
-            <a:off x="4572000" y="1326600"/>
-            <a:ext cx="4846320" cy="3188520"/>
+            <a:off x="2770200" y="3017520"/>
+            <a:ext cx="3630600" cy="2420280"/>
+          </a:xfrm>
+          <a:prstGeom prst="rect">
+            <a:avLst/>
+          </a:prstGeom>
+          <a:ln>
+            <a:noFill/>
+          </a:ln>
+        </p:spPr>
+      </p:pic>
+      <p:pic>
+        <p:nvPicPr>
+          <p:cNvPr id="49" name="" descr=""/>
+          <p:cNvPicPr/>
+          <p:nvPr/>
+        </p:nvPicPr>
+        <p:blipFill>
+          <a:blip r:embed="rId3"/>
+          <a:stretch/>
+        </p:blipFill>
+        <p:spPr>
+          <a:xfrm>
+            <a:off x="90720" y="88200"/>
+            <a:ext cx="3932640" cy="2621520"/>
           </a:xfrm>
           <a:prstGeom prst="rect">
             <a:avLst/>
@@ -3220,7 +3890,7 @@
       </p:grpSpPr>
       <p:sp>
         <p:nvSpPr>
-          <p:cNvPr id="52" name="TextShape 1"/>
+          <p:cNvPr id="50" name="TextShape 1"/>
           <p:cNvSpPr txBox="1"/>
           <p:nvPr/>
         </p:nvSpPr>
@@ -3249,7 +3919,7 @@
       </p:sp>
       <p:sp>
         <p:nvSpPr>
-          <p:cNvPr id="53" name="TextShape 2"/>
+          <p:cNvPr id="51" name="TextShape 2"/>
           <p:cNvSpPr txBox="1"/>
           <p:nvPr/>
         </p:nvSpPr>
@@ -3279,7 +3949,7 @@
       </p:sp>
       <p:pic>
         <p:nvPicPr>
-          <p:cNvPr id="54" name="" descr=""/>
+          <p:cNvPr id="52" name="" descr=""/>
           <p:cNvPicPr/>
           <p:nvPr/>
         </p:nvPicPr>
@@ -3289,8 +3959,8 @@
         </p:blipFill>
         <p:spPr>
           <a:xfrm>
-            <a:off x="177480" y="182880"/>
-            <a:ext cx="4028760" cy="2959200"/>
+            <a:off x="274320" y="1383480"/>
+            <a:ext cx="4453560" cy="3131640"/>
           </a:xfrm>
           <a:prstGeom prst="rect">
             <a:avLst/>
@@ -3302,7 +3972,7 @@
       </p:pic>
       <p:pic>
         <p:nvPicPr>
-          <p:cNvPr id="55" name="" descr=""/>
+          <p:cNvPr id="53" name="" descr=""/>
           <p:cNvPicPr/>
           <p:nvPr/>
         </p:nvPicPr>
@@ -3312,31 +3982,8 @@
         </p:blipFill>
         <p:spPr>
           <a:xfrm>
-            <a:off x="6056280" y="365760"/>
-            <a:ext cx="3519360" cy="2743200"/>
-          </a:xfrm>
-          <a:prstGeom prst="rect">
-            <a:avLst/>
-          </a:prstGeom>
-          <a:ln>
-            <a:noFill/>
-          </a:ln>
-        </p:spPr>
-      </p:pic>
-      <p:pic>
-        <p:nvPicPr>
-          <p:cNvPr id="56" name="" descr=""/>
-          <p:cNvPicPr/>
-          <p:nvPr/>
-        </p:nvPicPr>
-        <p:blipFill>
-          <a:blip r:embed="rId3"/>
-          <a:stretch/>
-        </p:blipFill>
-        <p:spPr>
-          <a:xfrm>
-            <a:off x="3200400" y="3017520"/>
-            <a:ext cx="3566160" cy="2572200"/>
+            <a:off x="4572000" y="1326600"/>
+            <a:ext cx="4846320" cy="3188520"/>
           </a:xfrm>
           <a:prstGeom prst="rect">
             <a:avLst/>
@@ -3397,7 +4044,7 @@
       </p:grpSpPr>
       <p:sp>
         <p:nvSpPr>
-          <p:cNvPr id="57" name="TextShape 1"/>
+          <p:cNvPr id="54" name="TextShape 1"/>
           <p:cNvSpPr txBox="1"/>
           <p:nvPr/>
         </p:nvSpPr>
@@ -3426,7 +4073,7 @@
       </p:sp>
       <p:sp>
         <p:nvSpPr>
-          <p:cNvPr id="58" name="TextShape 2"/>
+          <p:cNvPr id="55" name="TextShape 2"/>
           <p:cNvSpPr txBox="1"/>
           <p:nvPr/>
         </p:nvSpPr>
@@ -3456,7 +4103,7 @@
       </p:sp>
       <p:pic>
         <p:nvPicPr>
-          <p:cNvPr id="59" name="" descr=""/>
+          <p:cNvPr id="56" name="" descr=""/>
           <p:cNvPicPr/>
           <p:nvPr/>
         </p:nvPicPr>
@@ -3466,8 +4113,8 @@
         </p:blipFill>
         <p:spPr>
           <a:xfrm>
-            <a:off x="274320" y="91440"/>
-            <a:ext cx="4476240" cy="3304800"/>
+            <a:off x="750960" y="1398600"/>
+            <a:ext cx="4095360" cy="2990520"/>
           </a:xfrm>
           <a:prstGeom prst="rect">
             <a:avLst/>
@@ -3479,7 +4126,7 @@
       </p:pic>
       <p:pic>
         <p:nvPicPr>
-          <p:cNvPr id="60" name="" descr=""/>
+          <p:cNvPr id="57" name="" descr=""/>
           <p:cNvPicPr/>
           <p:nvPr/>
         </p:nvPicPr>
@@ -3489,31 +4136,8 @@
         </p:blipFill>
         <p:spPr>
           <a:xfrm>
-            <a:off x="5435280" y="182880"/>
-            <a:ext cx="4257360" cy="3390480"/>
-          </a:xfrm>
-          <a:prstGeom prst="rect">
-            <a:avLst/>
-          </a:prstGeom>
-          <a:ln>
-            <a:noFill/>
-          </a:ln>
-        </p:spPr>
-      </p:pic>
-      <p:pic>
-        <p:nvPicPr>
-          <p:cNvPr id="61" name="" descr=""/>
-          <p:cNvPicPr/>
-          <p:nvPr/>
-        </p:nvPicPr>
-        <p:blipFill>
-          <a:blip r:embed="rId3"/>
-          <a:stretch/>
-        </p:blipFill>
-        <p:spPr>
-          <a:xfrm>
-            <a:off x="2846520" y="2301480"/>
-            <a:ext cx="4285800" cy="3276360"/>
+            <a:off x="5577840" y="1326600"/>
+            <a:ext cx="4047840" cy="3028680"/>
           </a:xfrm>
           <a:prstGeom prst="rect">
             <a:avLst/>
@@ -3574,7 +4198,7 @@
       </p:grpSpPr>
       <p:sp>
         <p:nvSpPr>
-          <p:cNvPr id="62" name="TextShape 1"/>
+          <p:cNvPr id="58" name="TextShape 1"/>
           <p:cNvSpPr txBox="1"/>
           <p:nvPr/>
         </p:nvSpPr>
@@ -3603,7 +4227,7 @@
       </p:sp>
       <p:sp>
         <p:nvSpPr>
-          <p:cNvPr id="63" name="TextShape 2"/>
+          <p:cNvPr id="59" name="TextShape 2"/>
           <p:cNvSpPr txBox="1"/>
           <p:nvPr/>
         </p:nvSpPr>
@@ -3633,7 +4257,7 @@
       </p:sp>
       <p:pic>
         <p:nvPicPr>
-          <p:cNvPr id="64" name="" descr=""/>
+          <p:cNvPr id="60" name="" descr=""/>
           <p:cNvPicPr/>
           <p:nvPr/>
         </p:nvPicPr>
@@ -3643,8 +4267,8 @@
         </p:blipFill>
         <p:spPr>
           <a:xfrm>
-            <a:off x="182880" y="72720"/>
-            <a:ext cx="4276440" cy="3219120"/>
+            <a:off x="365760" y="196920"/>
+            <a:ext cx="3860280" cy="2637720"/>
           </a:xfrm>
           <a:prstGeom prst="rect">
             <a:avLst/>
@@ -3656,7 +4280,7 @@
       </p:pic>
       <p:pic>
         <p:nvPicPr>
-          <p:cNvPr id="65" name="" descr=""/>
+          <p:cNvPr id="61" name="" descr=""/>
           <p:cNvPicPr/>
           <p:nvPr/>
         </p:nvPicPr>
@@ -3666,8 +4290,8 @@
         </p:blipFill>
         <p:spPr>
           <a:xfrm>
-            <a:off x="5536440" y="160200"/>
-            <a:ext cx="4247640" cy="3314520"/>
+            <a:off x="5802120" y="93600"/>
+            <a:ext cx="3981960" cy="2741040"/>
           </a:xfrm>
           <a:prstGeom prst="rect">
             <a:avLst/>
@@ -3679,7 +4303,7 @@
       </p:pic>
       <p:pic>
         <p:nvPicPr>
-          <p:cNvPr id="66" name="" descr=""/>
+          <p:cNvPr id="62" name="" descr=""/>
           <p:cNvPicPr/>
           <p:nvPr/>
         </p:nvPicPr>
@@ -3689,8 +4313,8 @@
         </p:blipFill>
         <p:spPr>
           <a:xfrm>
-            <a:off x="3172320" y="2377440"/>
-            <a:ext cx="4142880" cy="3342960"/>
+            <a:off x="3050640" y="2815200"/>
+            <a:ext cx="4023360" cy="2781720"/>
           </a:xfrm>
           <a:prstGeom prst="rect">
             <a:avLst/>
@@ -3751,7 +4375,7 @@
       </p:grpSpPr>
       <p:sp>
         <p:nvSpPr>
-          <p:cNvPr id="67" name="TextShape 1"/>
+          <p:cNvPr id="63" name="TextShape 1"/>
           <p:cNvSpPr txBox="1"/>
           <p:nvPr/>
         </p:nvSpPr>
@@ -3780,7 +4404,7 @@
       </p:sp>
       <p:sp>
         <p:nvSpPr>
-          <p:cNvPr id="68" name="TextShape 2"/>
+          <p:cNvPr id="64" name="TextShape 2"/>
           <p:cNvSpPr txBox="1"/>
           <p:nvPr/>
         </p:nvSpPr>
@@ -3810,7 +4434,7 @@
       </p:sp>
       <p:pic>
         <p:nvPicPr>
-          <p:cNvPr id="69" name="" descr=""/>
+          <p:cNvPr id="65" name="" descr=""/>
           <p:cNvPicPr/>
           <p:nvPr/>
         </p:nvPicPr>
@@ -3820,8 +4444,8 @@
         </p:blipFill>
         <p:spPr>
           <a:xfrm>
-            <a:off x="750960" y="1398600"/>
-            <a:ext cx="4095360" cy="2990520"/>
+            <a:off x="91440" y="301320"/>
+            <a:ext cx="4123800" cy="2990520"/>
           </a:xfrm>
           <a:prstGeom prst="rect">
             <a:avLst/>
@@ -3833,7 +4457,7 @@
       </p:pic>
       <p:pic>
         <p:nvPicPr>
-          <p:cNvPr id="70" name="" descr=""/>
+          <p:cNvPr id="66" name="" descr=""/>
           <p:cNvPicPr/>
           <p:nvPr/>
         </p:nvPicPr>
@@ -3843,8 +4467,31 @@
         </p:blipFill>
         <p:spPr>
           <a:xfrm>
-            <a:off x="5577840" y="1326600"/>
-            <a:ext cx="4047840" cy="3028680"/>
+            <a:off x="5461200" y="226080"/>
+            <a:ext cx="4114440" cy="2962080"/>
+          </a:xfrm>
+          <a:prstGeom prst="rect">
+            <a:avLst/>
+          </a:prstGeom>
+          <a:ln>
+            <a:noFill/>
+          </a:ln>
+        </p:spPr>
+      </p:pic>
+      <p:pic>
+        <p:nvPicPr>
+          <p:cNvPr id="67" name="" descr=""/>
+          <p:cNvPicPr/>
+          <p:nvPr/>
+        </p:nvPicPr>
+        <p:blipFill>
+          <a:blip r:embed="rId3"/>
+          <a:stretch/>
+        </p:blipFill>
+        <p:spPr>
+          <a:xfrm>
+            <a:off x="2968200" y="2730240"/>
+            <a:ext cx="4438440" cy="2847600"/>
           </a:xfrm>
           <a:prstGeom prst="rect">
             <a:avLst/>
@@ -3905,14 +4552,14 @@
       </p:grpSpPr>
       <p:sp>
         <p:nvSpPr>
-          <p:cNvPr id="71" name="TextShape 1"/>
+          <p:cNvPr id="68" name="TextShape 1"/>
           <p:cNvSpPr txBox="1"/>
           <p:nvPr/>
         </p:nvSpPr>
         <p:spPr>
           <a:xfrm>
-            <a:off x="504000" y="226080"/>
-            <a:ext cx="9071640" cy="946440"/>
+            <a:off x="504000" y="74160"/>
+            <a:ext cx="9071640" cy="1250280"/>
           </a:xfrm>
           <a:prstGeom prst="rect">
             <a:avLst/>
@@ -3926,6 +4573,12 @@
           <a:bodyPr lIns="0" rIns="0" tIns="0" bIns="0" anchor="ctr"/>
           <a:p>
             <a:pPr algn="ctr"/>
+            <a:r>
+              <a:rPr b="0" lang="en-US" sz="4400" spc="-1" strike="noStrike">
+                <a:latin typeface="Arial"/>
+              </a:rPr>
+              <a:t>Bytes that got fixed after 1 month and later corrupted after 3 months</a:t>
+            </a:r>
             <a:endParaRPr b="0" lang="en-US" sz="4400" spc="-1" strike="noStrike">
               <a:latin typeface="Arial"/>
             </a:endParaRPr>
@@ -3934,7 +4587,7 @@
       </p:sp>
       <p:sp>
         <p:nvSpPr>
-          <p:cNvPr id="72" name="TextShape 2"/>
+          <p:cNvPr id="69" name="TextShape 2"/>
           <p:cNvSpPr txBox="1"/>
           <p:nvPr/>
         </p:nvSpPr>
@@ -3964,7 +4617,7 @@
       </p:sp>
       <p:pic>
         <p:nvPicPr>
-          <p:cNvPr id="73" name="" descr=""/>
+          <p:cNvPr id="70" name="" descr=""/>
           <p:cNvPicPr/>
           <p:nvPr/>
         </p:nvPicPr>
@@ -3974,77 +4627,8 @@
         </p:blipFill>
         <p:spPr>
           <a:xfrm>
-            <a:off x="504000" y="0"/>
-            <a:ext cx="4362120" cy="2980800"/>
-          </a:xfrm>
-          <a:prstGeom prst="rect">
-            <a:avLst/>
-          </a:prstGeom>
-          <a:ln>
-            <a:noFill/>
-          </a:ln>
-        </p:spPr>
-      </p:pic>
-      <p:pic>
-        <p:nvPicPr>
-          <p:cNvPr id="74" name="" descr=""/>
-          <p:cNvPicPr/>
-          <p:nvPr/>
-        </p:nvPicPr>
-        <p:blipFill>
-          <a:blip r:embed="rId2"/>
-          <a:stretch/>
-        </p:blipFill>
-        <p:spPr>
-          <a:xfrm>
-            <a:off x="5536440" y="93600"/>
-            <a:ext cx="4247640" cy="2923920"/>
-          </a:xfrm>
-          <a:prstGeom prst="rect">
-            <a:avLst/>
-          </a:prstGeom>
-          <a:ln>
-            <a:noFill/>
-          </a:ln>
-        </p:spPr>
-      </p:pic>
-      <p:pic>
-        <p:nvPicPr>
-          <p:cNvPr id="75" name="" descr=""/>
-          <p:cNvPicPr/>
-          <p:nvPr/>
-        </p:nvPicPr>
-        <p:blipFill>
-          <a:blip r:embed="rId3"/>
-          <a:stretch/>
-        </p:blipFill>
-        <p:spPr>
-          <a:xfrm>
-            <a:off x="640080" y="2834640"/>
-            <a:ext cx="4190760" cy="2990520"/>
-          </a:xfrm>
-          <a:prstGeom prst="rect">
-            <a:avLst/>
-          </a:prstGeom>
-          <a:ln>
-            <a:noFill/>
-          </a:ln>
-        </p:spPr>
-      </p:pic>
-      <p:pic>
-        <p:nvPicPr>
-          <p:cNvPr id="76" name="" descr=""/>
-          <p:cNvPicPr/>
-          <p:nvPr/>
-        </p:nvPicPr>
-        <p:blipFill>
-          <a:blip r:embed="rId4"/>
-          <a:stretch/>
-        </p:blipFill>
-        <p:spPr>
-          <a:xfrm>
-            <a:off x="5738040" y="3017520"/>
-            <a:ext cx="4228920" cy="2923920"/>
+            <a:off x="3017520" y="1554480"/>
+            <a:ext cx="4123800" cy="2980800"/>
           </a:xfrm>
           <a:prstGeom prst="rect">
             <a:avLst/>
@@ -4105,7 +4689,7 @@
       </p:grpSpPr>
       <p:sp>
         <p:nvSpPr>
-          <p:cNvPr id="77" name="TextShape 1"/>
+          <p:cNvPr id="71" name="TextShape 1"/>
           <p:cNvSpPr txBox="1"/>
           <p:nvPr/>
         </p:nvSpPr>
@@ -4126,6 +4710,12 @@
           <a:bodyPr lIns="0" rIns="0" tIns="0" bIns="0" anchor="ctr"/>
           <a:p>
             <a:pPr algn="ctr"/>
+            <a:r>
+              <a:rPr b="0" lang="en-US" sz="4400" spc="-1" strike="noStrike">
+                <a:latin typeface="Arial"/>
+              </a:rPr>
+              <a:t>Chip 1 – Block 25</a:t>
+            </a:r>
             <a:endParaRPr b="0" lang="en-US" sz="4400" spc="-1" strike="noStrike">
               <a:latin typeface="Arial"/>
             </a:endParaRPr>
@@ -4134,7 +4724,7 @@
       </p:sp>
       <p:sp>
         <p:nvSpPr>
-          <p:cNvPr id="78" name="TextShape 2"/>
+          <p:cNvPr id="72" name="TextShape 2"/>
           <p:cNvSpPr txBox="1"/>
           <p:nvPr/>
         </p:nvSpPr>
@@ -4164,7 +4754,7 @@
       </p:sp>
       <p:pic>
         <p:nvPicPr>
-          <p:cNvPr id="79" name="" descr=""/>
+          <p:cNvPr id="73" name="" descr=""/>
           <p:cNvPicPr/>
           <p:nvPr/>
         </p:nvPicPr>
@@ -4174,8 +4764,8 @@
         </p:blipFill>
         <p:spPr>
           <a:xfrm>
-            <a:off x="91440" y="301320"/>
-            <a:ext cx="4123800" cy="2990520"/>
+            <a:off x="356760" y="1065240"/>
+            <a:ext cx="3392280" cy="2358000"/>
           </a:xfrm>
           <a:prstGeom prst="rect">
             <a:avLst/>
@@ -4187,7 +4777,7 @@
       </p:pic>
       <p:pic>
         <p:nvPicPr>
-          <p:cNvPr id="80" name="" descr=""/>
+          <p:cNvPr id="74" name="" descr=""/>
           <p:cNvPicPr/>
           <p:nvPr/>
         </p:nvPicPr>
@@ -4197,8 +4787,8 @@
         </p:blipFill>
         <p:spPr>
           <a:xfrm>
-            <a:off x="5461200" y="226080"/>
-            <a:ext cx="4114440" cy="2962080"/>
+            <a:off x="6492240" y="914400"/>
+            <a:ext cx="3616560" cy="2560320"/>
           </a:xfrm>
           <a:prstGeom prst="rect">
             <a:avLst/>
@@ -4210,7 +4800,7 @@
       </p:pic>
       <p:pic>
         <p:nvPicPr>
-          <p:cNvPr id="81" name="" descr=""/>
+          <p:cNvPr id="75" name="" descr=""/>
           <p:cNvPicPr/>
           <p:nvPr/>
         </p:nvPicPr>
@@ -4220,8 +4810,8 @@
         </p:blipFill>
         <p:spPr>
           <a:xfrm>
-            <a:off x="2968200" y="2730240"/>
-            <a:ext cx="4438440" cy="2847600"/>
+            <a:off x="3749040" y="3200400"/>
+            <a:ext cx="3264480" cy="2378880"/>
           </a:xfrm>
           <a:prstGeom prst="rect">
             <a:avLst/>

</xml_diff>